<commit_message>
removed xxx machine type from host#2 description
</commit_message>
<xml_diff>
--- a/PRU030000/PfsIcsMhsHardwareConfig.pptx
+++ b/PRU030000/PfsIcsMhsHardwareConfig.pptx
@@ -199,7 +199,7 @@
           <a:p>
             <a:fld id="{0E7767F3-F0D0-AC4A-B6F2-BE41A8C446B8}" type="datetimeFigureOut">
               <a:rPr lang="en-US" smtClean="0"/>
-              <a:t>8/23/18</a:t>
+              <a:t>8/25/18</a:t>
             </a:fld>
             <a:endParaRPr lang="en-US"/>
           </a:p>
@@ -722,7 +722,7 @@
           <a:p>
             <a:fld id="{8BB57321-8CD5-B147-89D8-813DDDD6AB04}" type="datetimeFigureOut">
               <a:rPr lang="en-US" smtClean="0"/>
-              <a:t>8/23/18</a:t>
+              <a:t>8/25/18</a:t>
             </a:fld>
             <a:endParaRPr lang="en-US"/>
           </a:p>
@@ -920,7 +920,7 @@
           <a:p>
             <a:fld id="{8BB57321-8CD5-B147-89D8-813DDDD6AB04}" type="datetimeFigureOut">
               <a:rPr lang="en-US" smtClean="0"/>
-              <a:t>8/23/18</a:t>
+              <a:t>8/25/18</a:t>
             </a:fld>
             <a:endParaRPr lang="en-US"/>
           </a:p>
@@ -1128,7 +1128,7 @@
           <a:p>
             <a:fld id="{8BB57321-8CD5-B147-89D8-813DDDD6AB04}" type="datetimeFigureOut">
               <a:rPr lang="en-US" smtClean="0"/>
-              <a:t>8/23/18</a:t>
+              <a:t>8/25/18</a:t>
             </a:fld>
             <a:endParaRPr lang="en-US"/>
           </a:p>
@@ -1326,7 +1326,7 @@
           <a:p>
             <a:fld id="{8BB57321-8CD5-B147-89D8-813DDDD6AB04}" type="datetimeFigureOut">
               <a:rPr lang="en-US" smtClean="0"/>
-              <a:t>8/23/18</a:t>
+              <a:t>8/25/18</a:t>
             </a:fld>
             <a:endParaRPr lang="en-US"/>
           </a:p>
@@ -1601,7 +1601,7 @@
           <a:p>
             <a:fld id="{8BB57321-8CD5-B147-89D8-813DDDD6AB04}" type="datetimeFigureOut">
               <a:rPr lang="en-US" smtClean="0"/>
-              <a:t>8/23/18</a:t>
+              <a:t>8/25/18</a:t>
             </a:fld>
             <a:endParaRPr lang="en-US"/>
           </a:p>
@@ -1866,7 +1866,7 @@
           <a:p>
             <a:fld id="{8BB57321-8CD5-B147-89D8-813DDDD6AB04}" type="datetimeFigureOut">
               <a:rPr lang="en-US" smtClean="0"/>
-              <a:t>8/23/18</a:t>
+              <a:t>8/25/18</a:t>
             </a:fld>
             <a:endParaRPr lang="en-US"/>
           </a:p>
@@ -2278,7 +2278,7 @@
           <a:p>
             <a:fld id="{8BB57321-8CD5-B147-89D8-813DDDD6AB04}" type="datetimeFigureOut">
               <a:rPr lang="en-US" smtClean="0"/>
-              <a:t>8/23/18</a:t>
+              <a:t>8/25/18</a:t>
             </a:fld>
             <a:endParaRPr lang="en-US"/>
           </a:p>
@@ -2419,7 +2419,7 @@
           <a:p>
             <a:fld id="{8BB57321-8CD5-B147-89D8-813DDDD6AB04}" type="datetimeFigureOut">
               <a:rPr lang="en-US" smtClean="0"/>
-              <a:t>8/23/18</a:t>
+              <a:t>8/25/18</a:t>
             </a:fld>
             <a:endParaRPr lang="en-US"/>
           </a:p>
@@ -2532,7 +2532,7 @@
           <a:p>
             <a:fld id="{8BB57321-8CD5-B147-89D8-813DDDD6AB04}" type="datetimeFigureOut">
               <a:rPr lang="en-US" smtClean="0"/>
-              <a:t>8/23/18</a:t>
+              <a:t>8/25/18</a:t>
             </a:fld>
             <a:endParaRPr lang="en-US"/>
           </a:p>
@@ -2843,7 +2843,7 @@
           <a:p>
             <a:fld id="{8BB57321-8CD5-B147-89D8-813DDDD6AB04}" type="datetimeFigureOut">
               <a:rPr lang="en-US" smtClean="0"/>
-              <a:t>8/23/18</a:t>
+              <a:t>8/25/18</a:t>
             </a:fld>
             <a:endParaRPr lang="en-US"/>
           </a:p>
@@ -3131,7 +3131,7 @@
           <a:p>
             <a:fld id="{8BB57321-8CD5-B147-89D8-813DDDD6AB04}" type="datetimeFigureOut">
               <a:rPr lang="en-US" smtClean="0"/>
-              <a:t>8/23/18</a:t>
+              <a:t>8/25/18</a:t>
             </a:fld>
             <a:endParaRPr lang="en-US"/>
           </a:p>
@@ -3372,7 +3372,7 @@
           <a:p>
             <a:fld id="{8BB57321-8CD5-B147-89D8-813DDDD6AB04}" type="datetimeFigureOut">
               <a:rPr lang="en-US" smtClean="0"/>
-              <a:t>8/23/18</a:t>
+              <a:t>8/25/18</a:t>
             </a:fld>
             <a:endParaRPr lang="en-US"/>
           </a:p>
@@ -4000,7 +4000,7 @@
                   <a:schemeClr val="tx1"/>
                 </a:solidFill>
               </a:rPr>
-              <a:t>(XXX R710 running Debian 9.x)</a:t>
+              <a:t>(Running Debian 9.x)</a:t>
             </a:r>
             <a:endParaRPr lang="en-US" dirty="0">
               <a:solidFill>

</xml_diff>

<commit_message>
updates based on additional comments on hardware changes by kyono, and disk organisation by craig
</commit_message>
<xml_diff>
--- a/PRU030000/PfsIcsMhsHardwareConfig.pptx
+++ b/PRU030000/PfsIcsMhsHardwareConfig.pptx
@@ -5,12 +5,13 @@
     <p:sldMasterId id="2147483648" r:id="rId1"/>
   </p:sldMasterIdLst>
   <p:notesMasterIdLst>
-    <p:notesMasterId r:id="rId5"/>
+    <p:notesMasterId r:id="rId6"/>
   </p:notesMasterIdLst>
   <p:sldIdLst>
     <p:sldId id="257" r:id="rId2"/>
-    <p:sldId id="256" r:id="rId3"/>
-    <p:sldId id="258" r:id="rId4"/>
+    <p:sldId id="259" r:id="rId3"/>
+    <p:sldId id="256" r:id="rId4"/>
+    <p:sldId id="258" r:id="rId5"/>
   </p:sldIdLst>
   <p:sldSz cx="12192000" cy="6858000"/>
   <p:notesSz cx="6858000" cy="9144000"/>
@@ -199,7 +200,7 @@
           <a:p>
             <a:fld id="{0E7767F3-F0D0-AC4A-B6F2-BE41A8C446B8}" type="datetimeFigureOut">
               <a:rPr lang="en-US" smtClean="0"/>
-              <a:t>8/25/18</a:t>
+              <a:t>8/26/18</a:t>
             </a:fld>
             <a:endParaRPr lang="en-US"/>
           </a:p>
@@ -722,7 +723,7 @@
           <a:p>
             <a:fld id="{8BB57321-8CD5-B147-89D8-813DDDD6AB04}" type="datetimeFigureOut">
               <a:rPr lang="en-US" smtClean="0"/>
-              <a:t>8/25/18</a:t>
+              <a:t>8/26/18</a:t>
             </a:fld>
             <a:endParaRPr lang="en-US"/>
           </a:p>
@@ -920,7 +921,7 @@
           <a:p>
             <a:fld id="{8BB57321-8CD5-B147-89D8-813DDDD6AB04}" type="datetimeFigureOut">
               <a:rPr lang="en-US" smtClean="0"/>
-              <a:t>8/25/18</a:t>
+              <a:t>8/26/18</a:t>
             </a:fld>
             <a:endParaRPr lang="en-US"/>
           </a:p>
@@ -1128,7 +1129,7 @@
           <a:p>
             <a:fld id="{8BB57321-8CD5-B147-89D8-813DDDD6AB04}" type="datetimeFigureOut">
               <a:rPr lang="en-US" smtClean="0"/>
-              <a:t>8/25/18</a:t>
+              <a:t>8/26/18</a:t>
             </a:fld>
             <a:endParaRPr lang="en-US"/>
           </a:p>
@@ -1326,7 +1327,7 @@
           <a:p>
             <a:fld id="{8BB57321-8CD5-B147-89D8-813DDDD6AB04}" type="datetimeFigureOut">
               <a:rPr lang="en-US" smtClean="0"/>
-              <a:t>8/25/18</a:t>
+              <a:t>8/26/18</a:t>
             </a:fld>
             <a:endParaRPr lang="en-US"/>
           </a:p>
@@ -1601,7 +1602,7 @@
           <a:p>
             <a:fld id="{8BB57321-8CD5-B147-89D8-813DDDD6AB04}" type="datetimeFigureOut">
               <a:rPr lang="en-US" smtClean="0"/>
-              <a:t>8/25/18</a:t>
+              <a:t>8/26/18</a:t>
             </a:fld>
             <a:endParaRPr lang="en-US"/>
           </a:p>
@@ -1866,7 +1867,7 @@
           <a:p>
             <a:fld id="{8BB57321-8CD5-B147-89D8-813DDDD6AB04}" type="datetimeFigureOut">
               <a:rPr lang="en-US" smtClean="0"/>
-              <a:t>8/25/18</a:t>
+              <a:t>8/26/18</a:t>
             </a:fld>
             <a:endParaRPr lang="en-US"/>
           </a:p>
@@ -2278,7 +2279,7 @@
           <a:p>
             <a:fld id="{8BB57321-8CD5-B147-89D8-813DDDD6AB04}" type="datetimeFigureOut">
               <a:rPr lang="en-US" smtClean="0"/>
-              <a:t>8/25/18</a:t>
+              <a:t>8/26/18</a:t>
             </a:fld>
             <a:endParaRPr lang="en-US"/>
           </a:p>
@@ -2419,7 +2420,7 @@
           <a:p>
             <a:fld id="{8BB57321-8CD5-B147-89D8-813DDDD6AB04}" type="datetimeFigureOut">
               <a:rPr lang="en-US" smtClean="0"/>
-              <a:t>8/25/18</a:t>
+              <a:t>8/26/18</a:t>
             </a:fld>
             <a:endParaRPr lang="en-US"/>
           </a:p>
@@ -2532,7 +2533,7 @@
           <a:p>
             <a:fld id="{8BB57321-8CD5-B147-89D8-813DDDD6AB04}" type="datetimeFigureOut">
               <a:rPr lang="en-US" smtClean="0"/>
-              <a:t>8/25/18</a:t>
+              <a:t>8/26/18</a:t>
             </a:fld>
             <a:endParaRPr lang="en-US"/>
           </a:p>
@@ -2843,7 +2844,7 @@
           <a:p>
             <a:fld id="{8BB57321-8CD5-B147-89D8-813DDDD6AB04}" type="datetimeFigureOut">
               <a:rPr lang="en-US" smtClean="0"/>
-              <a:t>8/25/18</a:t>
+              <a:t>8/26/18</a:t>
             </a:fld>
             <a:endParaRPr lang="en-US"/>
           </a:p>
@@ -3131,7 +3132,7 @@
           <a:p>
             <a:fld id="{8BB57321-8CD5-B147-89D8-813DDDD6AB04}" type="datetimeFigureOut">
               <a:rPr lang="en-US" smtClean="0"/>
-              <a:t>8/25/18</a:t>
+              <a:t>8/26/18</a:t>
             </a:fld>
             <a:endParaRPr lang="en-US"/>
           </a:p>
@@ -3372,7 +3373,7 @@
           <a:p>
             <a:fld id="{8BB57321-8CD5-B147-89D8-813DDDD6AB04}" type="datetimeFigureOut">
               <a:rPr lang="en-US" smtClean="0"/>
-              <a:t>8/25/18</a:t>
+              <a:t>8/26/18</a:t>
             </a:fld>
             <a:endParaRPr lang="en-US"/>
           </a:p>
@@ -3773,6 +3774,1402 @@
 </file>
 
 <file path=ppt/slides/slide1.xml><?xml version="1.0" encoding="utf-8"?>
+<p:sld xmlns:a="http://schemas.openxmlformats.org/drawingml/2006/main" xmlns:r="http://schemas.openxmlformats.org/officeDocument/2006/relationships" xmlns:p="http://schemas.openxmlformats.org/presentationml/2006/main" show="0">
+  <p:cSld>
+    <p:spTree>
+      <p:nvGrpSpPr>
+        <p:cNvPr id="1" name=""/>
+        <p:cNvGrpSpPr/>
+        <p:nvPr/>
+      </p:nvGrpSpPr>
+      <p:grpSpPr>
+        <a:xfrm>
+          <a:off x="0" y="0"/>
+          <a:ext cx="0" cy="0"/>
+          <a:chOff x="0" y="0"/>
+          <a:chExt cx="0" cy="0"/>
+        </a:xfrm>
+      </p:grpSpPr>
+      <p:sp>
+        <p:nvSpPr>
+          <p:cNvPr id="40" name="Rectangle 39">
+            <a:extLst>
+              <a:ext uri="{FF2B5EF4-FFF2-40B4-BE49-F238E27FC236}">
+                <a16:creationId xmlns:a16="http://schemas.microsoft.com/office/drawing/2014/main" id="{D34B1D36-3867-124F-B453-E74E51A181DF}"/>
+              </a:ext>
+            </a:extLst>
+          </p:cNvPr>
+          <p:cNvSpPr/>
+          <p:nvPr/>
+        </p:nvSpPr>
+        <p:spPr>
+          <a:xfrm>
+            <a:off x="43247" y="27290"/>
+            <a:ext cx="4096267" cy="1699772"/>
+          </a:xfrm>
+          <a:prstGeom prst="rect">
+            <a:avLst/>
+          </a:prstGeom>
+          <a:solidFill>
+            <a:schemeClr val="bg2"/>
+          </a:solidFill>
+        </p:spPr>
+        <p:style>
+          <a:lnRef idx="2">
+            <a:schemeClr val="accent1">
+              <a:shade val="50000"/>
+            </a:schemeClr>
+          </a:lnRef>
+          <a:fillRef idx="1">
+            <a:schemeClr val="accent1"/>
+          </a:fillRef>
+          <a:effectRef idx="0">
+            <a:schemeClr val="accent1"/>
+          </a:effectRef>
+          <a:fontRef idx="minor">
+            <a:schemeClr val="lt1"/>
+          </a:fontRef>
+        </p:style>
+        <p:txBody>
+          <a:bodyPr rtlCol="0" anchor="ctr"/>
+          <a:lstStyle/>
+          <a:p>
+            <a:pPr algn="ctr"/>
+            <a:endParaRPr lang="en-US"/>
+          </a:p>
+        </p:txBody>
+      </p:sp>
+      <p:sp>
+        <p:nvSpPr>
+          <p:cNvPr id="5" name="Rectangle 4">
+            <a:extLst>
+              <a:ext uri="{FF2B5EF4-FFF2-40B4-BE49-F238E27FC236}">
+                <a16:creationId xmlns:a16="http://schemas.microsoft.com/office/drawing/2014/main" id="{56A96FF9-994C-5D49-AA39-FCF9862BEE1D}"/>
+              </a:ext>
+            </a:extLst>
+          </p:cNvPr>
+          <p:cNvSpPr/>
+          <p:nvPr/>
+        </p:nvSpPr>
+        <p:spPr>
+          <a:xfrm>
+            <a:off x="7697196" y="758130"/>
+            <a:ext cx="1818526" cy="1171254"/>
+          </a:xfrm>
+          <a:prstGeom prst="rect">
+            <a:avLst/>
+          </a:prstGeom>
+          <a:solidFill>
+            <a:schemeClr val="accent5">
+              <a:lumMod val="20000"/>
+              <a:lumOff val="80000"/>
+            </a:schemeClr>
+          </a:solidFill>
+        </p:spPr>
+        <p:style>
+          <a:lnRef idx="2">
+            <a:schemeClr val="accent1">
+              <a:shade val="50000"/>
+            </a:schemeClr>
+          </a:lnRef>
+          <a:fillRef idx="1">
+            <a:schemeClr val="accent1"/>
+          </a:fillRef>
+          <a:effectRef idx="0">
+            <a:schemeClr val="accent1"/>
+          </a:effectRef>
+          <a:fontRef idx="minor">
+            <a:schemeClr val="lt1"/>
+          </a:fontRef>
+        </p:style>
+        <p:txBody>
+          <a:bodyPr rtlCol="0" anchor="ctr"/>
+          <a:lstStyle/>
+          <a:p>
+            <a:pPr algn="ctr"/>
+            <a:r>
+              <a:rPr lang="en-US" dirty="0">
+                <a:solidFill>
+                  <a:schemeClr val="tx1"/>
+                </a:solidFill>
+              </a:rPr>
+              <a:t>Host #1</a:t>
+            </a:r>
+          </a:p>
+          <a:p>
+            <a:pPr algn="ctr"/>
+            <a:r>
+              <a:rPr lang="en-US" dirty="0">
+                <a:solidFill>
+                  <a:schemeClr val="tx1"/>
+                </a:solidFill>
+              </a:rPr>
+              <a:t>rca1</a:t>
+            </a:r>
+          </a:p>
+          <a:p>
+            <a:pPr algn="ctr"/>
+            <a:r>
+              <a:rPr lang="en-US" sz="1200" dirty="0">
+                <a:solidFill>
+                  <a:schemeClr val="tx1"/>
+                </a:solidFill>
+              </a:rPr>
+              <a:t>(Dell R410 running Debian 9.x)</a:t>
+            </a:r>
+          </a:p>
+          <a:p>
+            <a:pPr algn="ctr"/>
+            <a:endParaRPr lang="en-US" dirty="0">
+              <a:solidFill>
+                <a:schemeClr val="tx1"/>
+              </a:solidFill>
+            </a:endParaRPr>
+          </a:p>
+        </p:txBody>
+      </p:sp>
+      <p:sp>
+        <p:nvSpPr>
+          <p:cNvPr id="6" name="Rectangle 5">
+            <a:extLst>
+              <a:ext uri="{FF2B5EF4-FFF2-40B4-BE49-F238E27FC236}">
+                <a16:creationId xmlns:a16="http://schemas.microsoft.com/office/drawing/2014/main" id="{1CE58D1B-62BA-B145-9493-56521A86B3EC}"/>
+              </a:ext>
+            </a:extLst>
+          </p:cNvPr>
+          <p:cNvSpPr/>
+          <p:nvPr/>
+        </p:nvSpPr>
+        <p:spPr>
+          <a:xfrm>
+            <a:off x="7700296" y="2170190"/>
+            <a:ext cx="1818526" cy="1171254"/>
+          </a:xfrm>
+          <a:prstGeom prst="rect">
+            <a:avLst/>
+          </a:prstGeom>
+          <a:solidFill>
+            <a:schemeClr val="accent5">
+              <a:lumMod val="20000"/>
+              <a:lumOff val="80000"/>
+            </a:schemeClr>
+          </a:solidFill>
+        </p:spPr>
+        <p:style>
+          <a:lnRef idx="2">
+            <a:schemeClr val="accent1">
+              <a:shade val="50000"/>
+            </a:schemeClr>
+          </a:lnRef>
+          <a:fillRef idx="1">
+            <a:schemeClr val="accent1"/>
+          </a:fillRef>
+          <a:effectRef idx="0">
+            <a:schemeClr val="accent1"/>
+          </a:effectRef>
+          <a:fontRef idx="minor">
+            <a:schemeClr val="lt1"/>
+          </a:fontRef>
+        </p:style>
+        <p:txBody>
+          <a:bodyPr rtlCol="0" anchor="ctr"/>
+          <a:lstStyle/>
+          <a:p>
+            <a:pPr algn="ctr"/>
+            <a:r>
+              <a:rPr lang="en-US" dirty="0">
+                <a:solidFill>
+                  <a:schemeClr val="tx1"/>
+                </a:solidFill>
+              </a:rPr>
+              <a:t>Host #2</a:t>
+            </a:r>
+          </a:p>
+          <a:p>
+            <a:pPr algn="ctr"/>
+            <a:r>
+              <a:rPr lang="en-US" dirty="0">
+                <a:solidFill>
+                  <a:schemeClr val="tx1"/>
+                </a:solidFill>
+              </a:rPr>
+              <a:t>rfa1</a:t>
+            </a:r>
+            <a:endParaRPr lang="en-US" sz="1200" dirty="0">
+              <a:solidFill>
+                <a:schemeClr val="tx1"/>
+              </a:solidFill>
+            </a:endParaRPr>
+          </a:p>
+          <a:p>
+            <a:pPr algn="ctr"/>
+            <a:r>
+              <a:rPr lang="en-US" sz="1200" dirty="0">
+                <a:solidFill>
+                  <a:schemeClr val="tx1"/>
+                </a:solidFill>
+              </a:rPr>
+              <a:t>(Dell R710 running Debian 9.x)</a:t>
+            </a:r>
+          </a:p>
+          <a:p>
+            <a:pPr algn="ctr"/>
+            <a:endParaRPr lang="en-US" dirty="0">
+              <a:solidFill>
+                <a:schemeClr val="tx1"/>
+              </a:solidFill>
+            </a:endParaRPr>
+          </a:p>
+        </p:txBody>
+      </p:sp>
+      <p:sp>
+        <p:nvSpPr>
+          <p:cNvPr id="7" name="Rectangle 6">
+            <a:extLst>
+              <a:ext uri="{FF2B5EF4-FFF2-40B4-BE49-F238E27FC236}">
+                <a16:creationId xmlns:a16="http://schemas.microsoft.com/office/drawing/2014/main" id="{0C63F87A-7448-1246-8DDB-5F9A0D20B6F2}"/>
+              </a:ext>
+            </a:extLst>
+          </p:cNvPr>
+          <p:cNvSpPr/>
+          <p:nvPr/>
+        </p:nvSpPr>
+        <p:spPr>
+          <a:xfrm>
+            <a:off x="7697196" y="3806204"/>
+            <a:ext cx="1818526" cy="1171254"/>
+          </a:xfrm>
+          <a:prstGeom prst="rect">
+            <a:avLst/>
+          </a:prstGeom>
+          <a:solidFill>
+            <a:schemeClr val="accent2">
+              <a:lumMod val="20000"/>
+              <a:lumOff val="80000"/>
+            </a:schemeClr>
+          </a:solidFill>
+        </p:spPr>
+        <p:style>
+          <a:lnRef idx="2">
+            <a:schemeClr val="accent1">
+              <a:shade val="50000"/>
+            </a:schemeClr>
+          </a:lnRef>
+          <a:fillRef idx="1">
+            <a:schemeClr val="accent1"/>
+          </a:fillRef>
+          <a:effectRef idx="0">
+            <a:schemeClr val="accent1"/>
+          </a:effectRef>
+          <a:fontRef idx="minor">
+            <a:schemeClr val="lt1"/>
+          </a:fontRef>
+        </p:style>
+        <p:txBody>
+          <a:bodyPr rtlCol="0" anchor="ctr"/>
+          <a:lstStyle/>
+          <a:p>
+            <a:pPr algn="ctr"/>
+            <a:r>
+              <a:rPr lang="en-US" dirty="0">
+                <a:solidFill>
+                  <a:schemeClr val="tx1"/>
+                </a:solidFill>
+              </a:rPr>
+              <a:t>NFS #1</a:t>
+            </a:r>
+          </a:p>
+          <a:p>
+            <a:pPr algn="ctr"/>
+            <a:r>
+              <a:rPr lang="en-US" dirty="0">
+                <a:solidFill>
+                  <a:schemeClr val="tx1"/>
+                </a:solidFill>
+              </a:rPr>
+              <a:t>rga1</a:t>
+            </a:r>
+          </a:p>
+          <a:p>
+            <a:pPr algn="ctr"/>
+            <a:r>
+              <a:rPr lang="en-US" sz="1200" dirty="0">
+                <a:solidFill>
+                  <a:schemeClr val="tx1"/>
+                </a:solidFill>
+              </a:rPr>
+              <a:t>(Dell R805 running Debian 9.x)</a:t>
+            </a:r>
+          </a:p>
+          <a:p>
+            <a:pPr algn="ctr"/>
+            <a:endParaRPr lang="en-US" dirty="0">
+              <a:solidFill>
+                <a:schemeClr val="tx1"/>
+              </a:solidFill>
+            </a:endParaRPr>
+          </a:p>
+        </p:txBody>
+      </p:sp>
+      <p:sp>
+        <p:nvSpPr>
+          <p:cNvPr id="11" name="Can 10">
+            <a:extLst>
+              <a:ext uri="{FF2B5EF4-FFF2-40B4-BE49-F238E27FC236}">
+                <a16:creationId xmlns:a16="http://schemas.microsoft.com/office/drawing/2014/main" id="{699FD7A6-3198-D44D-A337-6D1B418D2ED3}"/>
+              </a:ext>
+            </a:extLst>
+          </p:cNvPr>
+          <p:cNvSpPr/>
+          <p:nvPr/>
+        </p:nvSpPr>
+        <p:spPr>
+          <a:xfrm>
+            <a:off x="952372" y="3006526"/>
+            <a:ext cx="1902940" cy="2196678"/>
+          </a:xfrm>
+          <a:prstGeom prst="can">
+            <a:avLst/>
+          </a:prstGeom>
+          <a:solidFill>
+            <a:schemeClr val="accent6">
+              <a:lumMod val="20000"/>
+              <a:lumOff val="80000"/>
+            </a:schemeClr>
+          </a:solidFill>
+        </p:spPr>
+        <p:style>
+          <a:lnRef idx="2">
+            <a:schemeClr val="accent1">
+              <a:shade val="50000"/>
+            </a:schemeClr>
+          </a:lnRef>
+          <a:fillRef idx="1">
+            <a:schemeClr val="accent1"/>
+          </a:fillRef>
+          <a:effectRef idx="0">
+            <a:schemeClr val="accent1"/>
+          </a:effectRef>
+          <a:fontRef idx="minor">
+            <a:schemeClr val="lt1"/>
+          </a:fontRef>
+        </p:style>
+        <p:txBody>
+          <a:bodyPr rtlCol="0" anchor="ctr"/>
+          <a:lstStyle/>
+          <a:p>
+            <a:pPr algn="ctr"/>
+            <a:r>
+              <a:rPr lang="en-US" dirty="0">
+                <a:solidFill>
+                  <a:schemeClr val="tx1"/>
+                </a:solidFill>
+              </a:rPr>
+              <a:t>100TB</a:t>
+            </a:r>
+          </a:p>
+          <a:p>
+            <a:pPr algn="ctr"/>
+            <a:r>
+              <a:rPr lang="en-US" dirty="0">
+                <a:solidFill>
+                  <a:schemeClr val="tx1"/>
+                </a:solidFill>
+              </a:rPr>
+              <a:t>Disk array</a:t>
+            </a:r>
+          </a:p>
+        </p:txBody>
+      </p:sp>
+      <p:sp>
+        <p:nvSpPr>
+          <p:cNvPr id="17" name="Rectangle 16">
+            <a:extLst>
+              <a:ext uri="{FF2B5EF4-FFF2-40B4-BE49-F238E27FC236}">
+                <a16:creationId xmlns:a16="http://schemas.microsoft.com/office/drawing/2014/main" id="{E864FD33-2BE2-0A4C-94D5-C31D9D0B144C}"/>
+              </a:ext>
+            </a:extLst>
+          </p:cNvPr>
+          <p:cNvSpPr/>
+          <p:nvPr/>
+        </p:nvSpPr>
+        <p:spPr>
+          <a:xfrm>
+            <a:off x="2650595" y="1524741"/>
+            <a:ext cx="2054970" cy="404643"/>
+          </a:xfrm>
+          <a:prstGeom prst="rect">
+            <a:avLst/>
+          </a:prstGeom>
+          <a:solidFill>
+            <a:schemeClr val="accent3">
+              <a:lumMod val="20000"/>
+              <a:lumOff val="80000"/>
+            </a:schemeClr>
+          </a:solidFill>
+        </p:spPr>
+        <p:style>
+          <a:lnRef idx="2">
+            <a:schemeClr val="accent1">
+              <a:shade val="50000"/>
+            </a:schemeClr>
+          </a:lnRef>
+          <a:fillRef idx="1">
+            <a:schemeClr val="accent1"/>
+          </a:fillRef>
+          <a:effectRef idx="0">
+            <a:schemeClr val="accent1"/>
+          </a:effectRef>
+          <a:fontRef idx="minor">
+            <a:schemeClr val="lt1"/>
+          </a:fontRef>
+        </p:style>
+        <p:txBody>
+          <a:bodyPr rtlCol="0" anchor="ctr"/>
+          <a:lstStyle/>
+          <a:p>
+            <a:pPr algn="ctr"/>
+            <a:r>
+              <a:rPr lang="en-US" dirty="0">
+                <a:solidFill>
+                  <a:schemeClr val="tx1"/>
+                </a:solidFill>
+              </a:rPr>
+              <a:t>Subaru Core Switch</a:t>
+            </a:r>
+          </a:p>
+        </p:txBody>
+      </p:sp>
+      <p:sp>
+        <p:nvSpPr>
+          <p:cNvPr id="18" name="Rectangle 17">
+            <a:extLst>
+              <a:ext uri="{FF2B5EF4-FFF2-40B4-BE49-F238E27FC236}">
+                <a16:creationId xmlns:a16="http://schemas.microsoft.com/office/drawing/2014/main" id="{DE8BD652-6DC3-EA4A-AEE3-23D6FF8E50D5}"/>
+              </a:ext>
+            </a:extLst>
+          </p:cNvPr>
+          <p:cNvSpPr/>
+          <p:nvPr/>
+        </p:nvSpPr>
+        <p:spPr>
+          <a:xfrm>
+            <a:off x="2842054" y="2162447"/>
+            <a:ext cx="1668162" cy="404643"/>
+          </a:xfrm>
+          <a:prstGeom prst="rect">
+            <a:avLst/>
+          </a:prstGeom>
+          <a:solidFill>
+            <a:schemeClr val="accent3">
+              <a:lumMod val="20000"/>
+              <a:lumOff val="80000"/>
+            </a:schemeClr>
+          </a:solidFill>
+        </p:spPr>
+        <p:style>
+          <a:lnRef idx="2">
+            <a:schemeClr val="accent1">
+              <a:shade val="50000"/>
+            </a:schemeClr>
+          </a:lnRef>
+          <a:fillRef idx="1">
+            <a:schemeClr val="accent1"/>
+          </a:fillRef>
+          <a:effectRef idx="0">
+            <a:schemeClr val="accent1"/>
+          </a:effectRef>
+          <a:fontRef idx="minor">
+            <a:schemeClr val="lt1"/>
+          </a:fontRef>
+        </p:style>
+        <p:txBody>
+          <a:bodyPr rtlCol="0" anchor="ctr"/>
+          <a:lstStyle/>
+          <a:p>
+            <a:pPr algn="ctr"/>
+            <a:r>
+              <a:rPr lang="en-US" dirty="0">
+                <a:solidFill>
+                  <a:schemeClr val="tx1"/>
+                </a:solidFill>
+              </a:rPr>
+              <a:t>PFS Core Switch</a:t>
+            </a:r>
+          </a:p>
+        </p:txBody>
+      </p:sp>
+      <p:cxnSp>
+        <p:nvCxnSpPr>
+          <p:cNvPr id="22" name="Elbow Connector 21">
+            <a:extLst>
+              <a:ext uri="{FF2B5EF4-FFF2-40B4-BE49-F238E27FC236}">
+                <a16:creationId xmlns:a16="http://schemas.microsoft.com/office/drawing/2014/main" id="{7B7E502B-40F5-7C41-B2FA-2DDFC6AB8FB4}"/>
+              </a:ext>
+            </a:extLst>
+          </p:cNvPr>
+          <p:cNvCxnSpPr>
+            <a:stCxn id="18" idx="3"/>
+            <a:endCxn id="6" idx="1"/>
+          </p:cNvCxnSpPr>
+          <p:nvPr/>
+        </p:nvCxnSpPr>
+        <p:spPr>
+          <a:xfrm>
+            <a:off x="4510216" y="2364769"/>
+            <a:ext cx="3190080" cy="391048"/>
+          </a:xfrm>
+          <a:prstGeom prst="bentConnector3">
+            <a:avLst/>
+          </a:prstGeom>
+          <a:ln>
+            <a:tailEnd type="triangle"/>
+          </a:ln>
+        </p:spPr>
+        <p:style>
+          <a:lnRef idx="1">
+            <a:schemeClr val="accent1"/>
+          </a:lnRef>
+          <a:fillRef idx="0">
+            <a:schemeClr val="accent1"/>
+          </a:fillRef>
+          <a:effectRef idx="0">
+            <a:schemeClr val="accent1"/>
+          </a:effectRef>
+          <a:fontRef idx="minor">
+            <a:schemeClr val="tx1"/>
+          </a:fontRef>
+        </p:style>
+      </p:cxnSp>
+      <p:cxnSp>
+        <p:nvCxnSpPr>
+          <p:cNvPr id="24" name="Elbow Connector 23">
+            <a:extLst>
+              <a:ext uri="{FF2B5EF4-FFF2-40B4-BE49-F238E27FC236}">
+                <a16:creationId xmlns:a16="http://schemas.microsoft.com/office/drawing/2014/main" id="{3E3D1EFE-D1DD-4348-866E-682DC871619A}"/>
+              </a:ext>
+            </a:extLst>
+          </p:cNvPr>
+          <p:cNvCxnSpPr>
+            <a:stCxn id="18" idx="3"/>
+            <a:endCxn id="5" idx="1"/>
+          </p:cNvCxnSpPr>
+          <p:nvPr/>
+        </p:nvCxnSpPr>
+        <p:spPr>
+          <a:xfrm flipV="1">
+            <a:off x="4510216" y="1343757"/>
+            <a:ext cx="3186980" cy="1021012"/>
+          </a:xfrm>
+          <a:prstGeom prst="bentConnector3">
+            <a:avLst/>
+          </a:prstGeom>
+          <a:ln>
+            <a:tailEnd type="triangle"/>
+          </a:ln>
+        </p:spPr>
+        <p:style>
+          <a:lnRef idx="1">
+            <a:schemeClr val="accent1"/>
+          </a:lnRef>
+          <a:fillRef idx="0">
+            <a:schemeClr val="accent1"/>
+          </a:fillRef>
+          <a:effectRef idx="0">
+            <a:schemeClr val="accent1"/>
+          </a:effectRef>
+          <a:fontRef idx="minor">
+            <a:schemeClr val="tx1"/>
+          </a:fontRef>
+        </p:style>
+      </p:cxnSp>
+      <p:cxnSp>
+        <p:nvCxnSpPr>
+          <p:cNvPr id="28" name="Elbow Connector 27">
+            <a:extLst>
+              <a:ext uri="{FF2B5EF4-FFF2-40B4-BE49-F238E27FC236}">
+                <a16:creationId xmlns:a16="http://schemas.microsoft.com/office/drawing/2014/main" id="{CBF7FFFF-CFCF-F944-89C5-9DEF282CD699}"/>
+              </a:ext>
+            </a:extLst>
+          </p:cNvPr>
+          <p:cNvCxnSpPr>
+            <a:stCxn id="18" idx="3"/>
+          </p:cNvCxnSpPr>
+          <p:nvPr/>
+        </p:nvCxnSpPr>
+        <p:spPr>
+          <a:xfrm>
+            <a:off x="4510216" y="2364769"/>
+            <a:ext cx="3186980" cy="1651177"/>
+          </a:xfrm>
+          <a:prstGeom prst="bentConnector3">
+            <a:avLst/>
+          </a:prstGeom>
+          <a:ln>
+            <a:tailEnd type="triangle"/>
+          </a:ln>
+        </p:spPr>
+        <p:style>
+          <a:lnRef idx="1">
+            <a:schemeClr val="accent1"/>
+          </a:lnRef>
+          <a:fillRef idx="0">
+            <a:schemeClr val="accent1"/>
+          </a:fillRef>
+          <a:effectRef idx="0">
+            <a:schemeClr val="accent1"/>
+          </a:effectRef>
+          <a:fontRef idx="minor">
+            <a:schemeClr val="tx1"/>
+          </a:fontRef>
+        </p:style>
+      </p:cxnSp>
+      <p:sp>
+        <p:nvSpPr>
+          <p:cNvPr id="35" name="Rectangle 34">
+            <a:extLst>
+              <a:ext uri="{FF2B5EF4-FFF2-40B4-BE49-F238E27FC236}">
+                <a16:creationId xmlns:a16="http://schemas.microsoft.com/office/drawing/2014/main" id="{A52F12D2-8B59-3645-81AA-801CCDEE5C99}"/>
+              </a:ext>
+            </a:extLst>
+          </p:cNvPr>
+          <p:cNvSpPr/>
+          <p:nvPr/>
+        </p:nvSpPr>
+        <p:spPr>
+          <a:xfrm>
+            <a:off x="1377241" y="629509"/>
+            <a:ext cx="914401" cy="667264"/>
+          </a:xfrm>
+          <a:prstGeom prst="rect">
+            <a:avLst/>
+          </a:prstGeom>
+          <a:solidFill>
+            <a:schemeClr val="accent1">
+              <a:lumMod val="20000"/>
+              <a:lumOff val="80000"/>
+            </a:schemeClr>
+          </a:solidFill>
+        </p:spPr>
+        <p:style>
+          <a:lnRef idx="2">
+            <a:schemeClr val="accent1">
+              <a:shade val="50000"/>
+            </a:schemeClr>
+          </a:lnRef>
+          <a:fillRef idx="1">
+            <a:schemeClr val="accent1"/>
+          </a:fillRef>
+          <a:effectRef idx="0">
+            <a:schemeClr val="accent1"/>
+          </a:effectRef>
+          <a:fontRef idx="minor">
+            <a:schemeClr val="lt1"/>
+          </a:fontRef>
+        </p:style>
+        <p:txBody>
+          <a:bodyPr rtlCol="0" anchor="ctr"/>
+          <a:lstStyle/>
+          <a:p>
+            <a:pPr algn="ctr"/>
+            <a:r>
+              <a:rPr lang="en-US" dirty="0">
+                <a:solidFill>
+                  <a:schemeClr val="tx1"/>
+                </a:solidFill>
+              </a:rPr>
+              <a:t>Gen2</a:t>
+            </a:r>
+          </a:p>
+        </p:txBody>
+      </p:sp>
+      <p:sp>
+        <p:nvSpPr>
+          <p:cNvPr id="37" name="Rectangle 36">
+            <a:extLst>
+              <a:ext uri="{FF2B5EF4-FFF2-40B4-BE49-F238E27FC236}">
+                <a16:creationId xmlns:a16="http://schemas.microsoft.com/office/drawing/2014/main" id="{8141C3DC-C78A-D64C-9861-C86E685560EE}"/>
+              </a:ext>
+            </a:extLst>
+          </p:cNvPr>
+          <p:cNvSpPr/>
+          <p:nvPr/>
+        </p:nvSpPr>
+        <p:spPr>
+          <a:xfrm>
+            <a:off x="253044" y="629509"/>
+            <a:ext cx="914401" cy="667264"/>
+          </a:xfrm>
+          <a:prstGeom prst="rect">
+            <a:avLst/>
+          </a:prstGeom>
+          <a:solidFill>
+            <a:schemeClr val="accent1">
+              <a:lumMod val="20000"/>
+              <a:lumOff val="80000"/>
+            </a:schemeClr>
+          </a:solidFill>
+        </p:spPr>
+        <p:style>
+          <a:lnRef idx="2">
+            <a:schemeClr val="accent1">
+              <a:shade val="50000"/>
+            </a:schemeClr>
+          </a:lnRef>
+          <a:fillRef idx="1">
+            <a:schemeClr val="accent1"/>
+          </a:fillRef>
+          <a:effectRef idx="0">
+            <a:schemeClr val="accent1"/>
+          </a:effectRef>
+          <a:fontRef idx="minor">
+            <a:schemeClr val="lt1"/>
+          </a:fontRef>
+        </p:style>
+        <p:txBody>
+          <a:bodyPr rtlCol="0" anchor="ctr"/>
+          <a:lstStyle/>
+          <a:p>
+            <a:pPr algn="ctr"/>
+            <a:r>
+              <a:rPr lang="en-US" dirty="0">
+                <a:solidFill>
+                  <a:schemeClr val="tx1"/>
+                </a:solidFill>
+              </a:rPr>
+              <a:t>VPN</a:t>
+            </a:r>
+          </a:p>
+        </p:txBody>
+      </p:sp>
+      <p:sp>
+        <p:nvSpPr>
+          <p:cNvPr id="41" name="TextBox 40">
+            <a:extLst>
+              <a:ext uri="{FF2B5EF4-FFF2-40B4-BE49-F238E27FC236}">
+                <a16:creationId xmlns:a16="http://schemas.microsoft.com/office/drawing/2014/main" id="{332DAB47-68C9-F94B-9C2D-9D4FA952EF8A}"/>
+              </a:ext>
+            </a:extLst>
+          </p:cNvPr>
+          <p:cNvSpPr txBox="1"/>
+          <p:nvPr/>
+        </p:nvSpPr>
+        <p:spPr>
+          <a:xfrm>
+            <a:off x="2443537" y="131944"/>
+            <a:ext cx="2026508" cy="369332"/>
+          </a:xfrm>
+          <a:prstGeom prst="rect">
+            <a:avLst/>
+          </a:prstGeom>
+          <a:noFill/>
+        </p:spPr>
+        <p:txBody>
+          <a:bodyPr wrap="square" rtlCol="0">
+            <a:spAutoFit/>
+          </a:bodyPr>
+          <a:lstStyle/>
+          <a:p>
+            <a:r>
+              <a:rPr lang="en-US" dirty="0"/>
+              <a:t>Subaru Internal</a:t>
+            </a:r>
+          </a:p>
+        </p:txBody>
+      </p:sp>
+      <p:sp>
+        <p:nvSpPr>
+          <p:cNvPr id="42" name="TextBox 41">
+            <a:extLst>
+              <a:ext uri="{FF2B5EF4-FFF2-40B4-BE49-F238E27FC236}">
+                <a16:creationId xmlns:a16="http://schemas.microsoft.com/office/drawing/2014/main" id="{3712EB77-4448-FA43-9E12-6B87376D024A}"/>
+              </a:ext>
+            </a:extLst>
+          </p:cNvPr>
+          <p:cNvSpPr txBox="1"/>
+          <p:nvPr/>
+        </p:nvSpPr>
+        <p:spPr>
+          <a:xfrm>
+            <a:off x="9625913" y="2339374"/>
+            <a:ext cx="2165034" cy="646331"/>
+          </a:xfrm>
+          <a:prstGeom prst="rect">
+            <a:avLst/>
+          </a:prstGeom>
+          <a:noFill/>
+        </p:spPr>
+        <p:txBody>
+          <a:bodyPr wrap="square" rtlCol="0">
+            <a:spAutoFit/>
+          </a:bodyPr>
+          <a:lstStyle/>
+          <a:p>
+            <a:pPr marL="171450" indent="-171450">
+              <a:buFont typeface="Arial" panose="020B0604020202020204" pitchFamily="34" charset="0"/>
+              <a:buChar char="•"/>
+            </a:pPr>
+            <a:r>
+              <a:rPr lang="en-US" sz="1200" dirty="0"/>
+              <a:t>Multiple VMs; one per actor. </a:t>
+            </a:r>
+          </a:p>
+          <a:p>
+            <a:pPr marL="171450" indent="-171450">
+              <a:buFont typeface="Arial" panose="020B0604020202020204" pitchFamily="34" charset="0"/>
+              <a:buChar char="•"/>
+            </a:pPr>
+            <a:r>
+              <a:rPr lang="en-US" sz="1200" dirty="0"/>
+              <a:t>DB (</a:t>
+            </a:r>
+            <a:r>
+              <a:rPr lang="en-US" sz="1200" dirty="0" err="1"/>
+              <a:t>postgres</a:t>
+            </a:r>
+            <a:r>
+              <a:rPr lang="en-US" sz="1200" dirty="0"/>
+              <a:t>) + archiver</a:t>
+            </a:r>
+          </a:p>
+          <a:p>
+            <a:pPr marL="171450" indent="-171450">
+              <a:buFont typeface="Arial" panose="020B0604020202020204" pitchFamily="34" charset="0"/>
+              <a:buChar char="•"/>
+            </a:pPr>
+            <a:r>
+              <a:rPr lang="en-US" sz="1200" dirty="0"/>
+              <a:t>NFS client</a:t>
+            </a:r>
+          </a:p>
+        </p:txBody>
+      </p:sp>
+      <p:sp>
+        <p:nvSpPr>
+          <p:cNvPr id="43" name="TextBox 42">
+            <a:extLst>
+              <a:ext uri="{FF2B5EF4-FFF2-40B4-BE49-F238E27FC236}">
+                <a16:creationId xmlns:a16="http://schemas.microsoft.com/office/drawing/2014/main" id="{48A7CBD5-72BE-714D-9E86-608CBE55F2BE}"/>
+              </a:ext>
+            </a:extLst>
+          </p:cNvPr>
+          <p:cNvSpPr txBox="1"/>
+          <p:nvPr/>
+        </p:nvSpPr>
+        <p:spPr>
+          <a:xfrm>
+            <a:off x="9642322" y="758130"/>
+            <a:ext cx="2244878" cy="1107996"/>
+          </a:xfrm>
+          <a:prstGeom prst="rect">
+            <a:avLst/>
+          </a:prstGeom>
+          <a:noFill/>
+        </p:spPr>
+        <p:txBody>
+          <a:bodyPr wrap="square" rtlCol="0">
+            <a:spAutoFit/>
+          </a:bodyPr>
+          <a:lstStyle/>
+          <a:p>
+            <a:endParaRPr lang="en-US" sz="1200" dirty="0"/>
+          </a:p>
+          <a:p>
+            <a:pPr marL="171450" indent="-171450">
+              <a:buFont typeface="Arial" panose="020B0604020202020204" pitchFamily="34" charset="0"/>
+              <a:buChar char="•"/>
+            </a:pPr>
+            <a:r>
+              <a:rPr lang="en-US" sz="1200" dirty="0"/>
+              <a:t>VM#1 for shell (shell-</a:t>
+            </a:r>
+            <a:r>
+              <a:rPr lang="en-US" sz="1200" dirty="0" err="1"/>
+              <a:t>ics</a:t>
+            </a:r>
+            <a:r>
+              <a:rPr lang="en-US" sz="1200" dirty="0"/>
+              <a:t>)</a:t>
+            </a:r>
+          </a:p>
+          <a:p>
+            <a:pPr marL="171450" indent="-171450">
+              <a:buFont typeface="Arial" panose="020B0604020202020204" pitchFamily="34" charset="0"/>
+              <a:buChar char="•"/>
+            </a:pPr>
+            <a:r>
+              <a:rPr lang="en-US" sz="1200" dirty="0"/>
+              <a:t>Multiple VMs; one per actor</a:t>
+            </a:r>
+          </a:p>
+          <a:p>
+            <a:pPr marL="171450" indent="-171450">
+              <a:buFont typeface="Arial" panose="020B0604020202020204" pitchFamily="34" charset="0"/>
+              <a:buChar char="•"/>
+            </a:pPr>
+            <a:r>
+              <a:rPr lang="en-US" sz="1200" dirty="0"/>
+              <a:t>NFS client</a:t>
+            </a:r>
+          </a:p>
+          <a:p>
+            <a:endParaRPr lang="en-US" dirty="0"/>
+          </a:p>
+        </p:txBody>
+      </p:sp>
+      <p:sp>
+        <p:nvSpPr>
+          <p:cNvPr id="44" name="TextBox 43">
+            <a:extLst>
+              <a:ext uri="{FF2B5EF4-FFF2-40B4-BE49-F238E27FC236}">
+                <a16:creationId xmlns:a16="http://schemas.microsoft.com/office/drawing/2014/main" id="{AF2DADEE-9EB8-914A-B161-E5C9C0966DEF}"/>
+              </a:ext>
+            </a:extLst>
+          </p:cNvPr>
+          <p:cNvSpPr txBox="1"/>
+          <p:nvPr/>
+        </p:nvSpPr>
+        <p:spPr>
+          <a:xfrm>
+            <a:off x="9625913" y="3849061"/>
+            <a:ext cx="1964724" cy="1384995"/>
+          </a:xfrm>
+          <a:prstGeom prst="rect">
+            <a:avLst/>
+          </a:prstGeom>
+          <a:noFill/>
+        </p:spPr>
+        <p:txBody>
+          <a:bodyPr wrap="square" rtlCol="0">
+            <a:spAutoFit/>
+          </a:bodyPr>
+          <a:lstStyle/>
+          <a:p>
+            <a:pPr marL="171450" indent="-171450">
+              <a:buFont typeface="Arial" panose="020B0604020202020204" pitchFamily="34" charset="0"/>
+              <a:buChar char="•"/>
+            </a:pPr>
+            <a:r>
+              <a:rPr lang="en-US" sz="1200" dirty="0"/>
+              <a:t>/home</a:t>
+            </a:r>
+          </a:p>
+          <a:p>
+            <a:pPr marL="171450" indent="-171450">
+              <a:buFont typeface="Arial" panose="020B0604020202020204" pitchFamily="34" charset="0"/>
+              <a:buChar char="•"/>
+            </a:pPr>
+            <a:r>
+              <a:rPr lang="en-US" sz="1200" dirty="0"/>
+              <a:t>/data</a:t>
+            </a:r>
+          </a:p>
+          <a:p>
+            <a:pPr marL="171450" indent="-171450">
+              <a:buFont typeface="Arial" panose="020B0604020202020204" pitchFamily="34" charset="0"/>
+              <a:buChar char="•"/>
+            </a:pPr>
+            <a:r>
+              <a:rPr lang="en-US" sz="1200" dirty="0"/>
+              <a:t>/software</a:t>
+            </a:r>
+          </a:p>
+          <a:p>
+            <a:pPr marL="171450" indent="-171450">
+              <a:buFont typeface="Arial" panose="020B0604020202020204" pitchFamily="34" charset="0"/>
+              <a:buChar char="•"/>
+            </a:pPr>
+            <a:r>
+              <a:rPr lang="en-US" sz="1200" dirty="0"/>
+              <a:t>VM data</a:t>
+            </a:r>
+          </a:p>
+          <a:p>
+            <a:pPr marL="171450" indent="-171450">
+              <a:buFont typeface="Arial" panose="020B0604020202020204" pitchFamily="34" charset="0"/>
+              <a:buChar char="•"/>
+            </a:pPr>
+            <a:r>
+              <a:rPr lang="en-US" sz="1200" dirty="0"/>
+              <a:t>NFS server</a:t>
+            </a:r>
+          </a:p>
+          <a:p>
+            <a:pPr marL="171450" indent="-171450">
+              <a:buFont typeface="Arial" panose="020B0604020202020204" pitchFamily="34" charset="0"/>
+              <a:buChar char="•"/>
+            </a:pPr>
+            <a:r>
+              <a:rPr lang="en-US" sz="1200" dirty="0"/>
+              <a:t>iSCSI between NFS#1 and Storage(100TB Disk array)</a:t>
+            </a:r>
+            <a:endParaRPr lang="en-US" dirty="0"/>
+          </a:p>
+        </p:txBody>
+      </p:sp>
+      <p:cxnSp>
+        <p:nvCxnSpPr>
+          <p:cNvPr id="46" name="Straight Connector 45">
+            <a:extLst>
+              <a:ext uri="{FF2B5EF4-FFF2-40B4-BE49-F238E27FC236}">
+                <a16:creationId xmlns:a16="http://schemas.microsoft.com/office/drawing/2014/main" id="{EF826BEC-FF59-2244-BFFE-EC8F041B8011}"/>
+              </a:ext>
+            </a:extLst>
+          </p:cNvPr>
+          <p:cNvCxnSpPr>
+            <a:cxnSpLocks/>
+            <a:stCxn id="17" idx="2"/>
+            <a:endCxn id="18" idx="0"/>
+          </p:cNvCxnSpPr>
+          <p:nvPr/>
+        </p:nvCxnSpPr>
+        <p:spPr>
+          <a:xfrm flipH="1">
+            <a:off x="3676135" y="1929384"/>
+            <a:ext cx="1945" cy="233063"/>
+          </a:xfrm>
+          <a:prstGeom prst="line">
+            <a:avLst/>
+          </a:prstGeom>
+        </p:spPr>
+        <p:style>
+          <a:lnRef idx="1">
+            <a:schemeClr val="accent1"/>
+          </a:lnRef>
+          <a:fillRef idx="0">
+            <a:schemeClr val="accent1"/>
+          </a:fillRef>
+          <a:effectRef idx="0">
+            <a:schemeClr val="accent1"/>
+          </a:effectRef>
+          <a:fontRef idx="minor">
+            <a:schemeClr val="tx1"/>
+          </a:fontRef>
+        </p:style>
+      </p:cxnSp>
+      <p:sp>
+        <p:nvSpPr>
+          <p:cNvPr id="47" name="Rectangle 46">
+            <a:extLst>
+              <a:ext uri="{FF2B5EF4-FFF2-40B4-BE49-F238E27FC236}">
+                <a16:creationId xmlns:a16="http://schemas.microsoft.com/office/drawing/2014/main" id="{E36B90A5-8C99-4A4E-B836-A23E1ADC1445}"/>
+              </a:ext>
+            </a:extLst>
+          </p:cNvPr>
+          <p:cNvSpPr/>
+          <p:nvPr/>
+        </p:nvSpPr>
+        <p:spPr>
+          <a:xfrm>
+            <a:off x="975050" y="5527184"/>
+            <a:ext cx="1853512" cy="732438"/>
+          </a:xfrm>
+          <a:prstGeom prst="rect">
+            <a:avLst/>
+          </a:prstGeom>
+          <a:solidFill>
+            <a:schemeClr val="accent1">
+              <a:lumMod val="20000"/>
+              <a:lumOff val="80000"/>
+            </a:schemeClr>
+          </a:solidFill>
+        </p:spPr>
+        <p:style>
+          <a:lnRef idx="2">
+            <a:schemeClr val="accent1">
+              <a:shade val="50000"/>
+            </a:schemeClr>
+          </a:lnRef>
+          <a:fillRef idx="1">
+            <a:schemeClr val="accent1"/>
+          </a:fillRef>
+          <a:effectRef idx="0">
+            <a:schemeClr val="accent1"/>
+          </a:effectRef>
+          <a:fontRef idx="minor">
+            <a:schemeClr val="lt1"/>
+          </a:fontRef>
+        </p:style>
+        <p:txBody>
+          <a:bodyPr rtlCol="0" anchor="ctr"/>
+          <a:lstStyle/>
+          <a:p>
+            <a:pPr algn="ctr"/>
+            <a:r>
+              <a:rPr lang="en-US" dirty="0">
+                <a:solidFill>
+                  <a:schemeClr val="tx1"/>
+                </a:solidFill>
+              </a:rPr>
+              <a:t>Controller</a:t>
+            </a:r>
+          </a:p>
+        </p:txBody>
+      </p:sp>
+      <p:cxnSp>
+        <p:nvCxnSpPr>
+          <p:cNvPr id="52" name="Straight Arrow Connector 51">
+            <a:extLst>
+              <a:ext uri="{FF2B5EF4-FFF2-40B4-BE49-F238E27FC236}">
+                <a16:creationId xmlns:a16="http://schemas.microsoft.com/office/drawing/2014/main" id="{E32A7BE0-BB3C-864A-8357-1255E042E7E7}"/>
+              </a:ext>
+            </a:extLst>
+          </p:cNvPr>
+          <p:cNvCxnSpPr>
+            <a:cxnSpLocks/>
+            <a:stCxn id="11" idx="3"/>
+            <a:endCxn id="47" idx="0"/>
+          </p:cNvCxnSpPr>
+          <p:nvPr/>
+        </p:nvCxnSpPr>
+        <p:spPr>
+          <a:xfrm flipH="1">
+            <a:off x="1901806" y="5203204"/>
+            <a:ext cx="2036" cy="323980"/>
+          </a:xfrm>
+          <a:prstGeom prst="straightConnector1">
+            <a:avLst/>
+          </a:prstGeom>
+          <a:ln>
+            <a:tailEnd type="triangle"/>
+          </a:ln>
+        </p:spPr>
+        <p:style>
+          <a:lnRef idx="1">
+            <a:schemeClr val="accent1"/>
+          </a:lnRef>
+          <a:fillRef idx="0">
+            <a:schemeClr val="accent1"/>
+          </a:fillRef>
+          <a:effectRef idx="0">
+            <a:schemeClr val="accent1"/>
+          </a:effectRef>
+          <a:fontRef idx="minor">
+            <a:schemeClr val="tx1"/>
+          </a:fontRef>
+        </p:style>
+      </p:cxnSp>
+      <p:sp>
+        <p:nvSpPr>
+          <p:cNvPr id="27" name="Rectangle 26">
+            <a:extLst>
+              <a:ext uri="{FF2B5EF4-FFF2-40B4-BE49-F238E27FC236}">
+                <a16:creationId xmlns:a16="http://schemas.microsoft.com/office/drawing/2014/main" id="{D8431A07-2F79-B849-98EB-6FC7DDD61BD9}"/>
+              </a:ext>
+            </a:extLst>
+          </p:cNvPr>
+          <p:cNvSpPr/>
+          <p:nvPr/>
+        </p:nvSpPr>
+        <p:spPr>
+          <a:xfrm>
+            <a:off x="4631825" y="158636"/>
+            <a:ext cx="1773936" cy="544703"/>
+          </a:xfrm>
+          <a:prstGeom prst="rect">
+            <a:avLst/>
+          </a:prstGeom>
+          <a:solidFill>
+            <a:schemeClr val="accent4">
+              <a:lumMod val="40000"/>
+              <a:lumOff val="60000"/>
+            </a:schemeClr>
+          </a:solidFill>
+          <a:ln>
+            <a:solidFill>
+              <a:schemeClr val="accent4">
+                <a:lumMod val="75000"/>
+              </a:schemeClr>
+            </a:solidFill>
+          </a:ln>
+        </p:spPr>
+        <p:style>
+          <a:lnRef idx="2">
+            <a:schemeClr val="accent1">
+              <a:shade val="50000"/>
+            </a:schemeClr>
+          </a:lnRef>
+          <a:fillRef idx="1">
+            <a:schemeClr val="accent1"/>
+          </a:fillRef>
+          <a:effectRef idx="0">
+            <a:schemeClr val="accent1"/>
+          </a:effectRef>
+          <a:fontRef idx="minor">
+            <a:schemeClr val="lt1"/>
+          </a:fontRef>
+        </p:style>
+        <p:txBody>
+          <a:bodyPr rtlCol="0" anchor="ctr"/>
+          <a:lstStyle/>
+          <a:p>
+            <a:pPr algn="ctr"/>
+            <a:r>
+              <a:rPr lang="en-US" dirty="0">
+                <a:solidFill>
+                  <a:schemeClr val="accent4">
+                    <a:lumMod val="50000"/>
+                  </a:schemeClr>
+                </a:solidFill>
+              </a:rPr>
+              <a:t>Mitsubishi MLP1</a:t>
+            </a:r>
+          </a:p>
+        </p:txBody>
+      </p:sp>
+      <p:cxnSp>
+        <p:nvCxnSpPr>
+          <p:cNvPr id="30" name="Elbow Connector 29">
+            <a:extLst>
+              <a:ext uri="{FF2B5EF4-FFF2-40B4-BE49-F238E27FC236}">
+                <a16:creationId xmlns:a16="http://schemas.microsoft.com/office/drawing/2014/main" id="{A8E8EEF8-D7C0-6444-B4FD-4EB221373182}"/>
+              </a:ext>
+            </a:extLst>
+          </p:cNvPr>
+          <p:cNvCxnSpPr>
+            <a:cxnSpLocks/>
+          </p:cNvCxnSpPr>
+          <p:nvPr/>
+        </p:nvCxnSpPr>
+        <p:spPr>
+          <a:xfrm rot="16200000" flipH="1">
+            <a:off x="5808687" y="380194"/>
+            <a:ext cx="1595514" cy="2175303"/>
+          </a:xfrm>
+          <a:prstGeom prst="bentConnector2">
+            <a:avLst/>
+          </a:prstGeom>
+          <a:ln>
+            <a:solidFill>
+              <a:schemeClr val="accent4">
+                <a:lumMod val="50000"/>
+              </a:schemeClr>
+            </a:solidFill>
+            <a:prstDash val="sysDot"/>
+            <a:headEnd type="triangle"/>
+            <a:tailEnd type="none"/>
+          </a:ln>
+        </p:spPr>
+        <p:style>
+          <a:lnRef idx="1">
+            <a:schemeClr val="accent1"/>
+          </a:lnRef>
+          <a:fillRef idx="0">
+            <a:schemeClr val="accent1"/>
+          </a:fillRef>
+          <a:effectRef idx="0">
+            <a:schemeClr val="accent1"/>
+          </a:effectRef>
+          <a:fontRef idx="minor">
+            <a:schemeClr val="tx1"/>
+          </a:fontRef>
+        </p:style>
+      </p:cxnSp>
+      <p:cxnSp>
+        <p:nvCxnSpPr>
+          <p:cNvPr id="14" name="Elbow Connector 13">
+            <a:extLst>
+              <a:ext uri="{FF2B5EF4-FFF2-40B4-BE49-F238E27FC236}">
+                <a16:creationId xmlns:a16="http://schemas.microsoft.com/office/drawing/2014/main" id="{AFCDF692-43D6-2944-B274-D28EB9F70120}"/>
+              </a:ext>
+            </a:extLst>
+          </p:cNvPr>
+          <p:cNvCxnSpPr>
+            <a:endCxn id="27" idx="2"/>
+          </p:cNvCxnSpPr>
+          <p:nvPr/>
+        </p:nvCxnSpPr>
+        <p:spPr>
+          <a:xfrm rot="10800000">
+            <a:off x="5518794" y="703340"/>
+            <a:ext cx="2175303" cy="361373"/>
+          </a:xfrm>
+          <a:prstGeom prst="bentConnector2">
+            <a:avLst/>
+          </a:prstGeom>
+          <a:ln>
+            <a:solidFill>
+              <a:schemeClr val="accent4">
+                <a:lumMod val="75000"/>
+              </a:schemeClr>
+            </a:solidFill>
+            <a:tailEnd type="none"/>
+          </a:ln>
+        </p:spPr>
+        <p:style>
+          <a:lnRef idx="1">
+            <a:schemeClr val="accent1"/>
+          </a:lnRef>
+          <a:fillRef idx="0">
+            <a:schemeClr val="accent1"/>
+          </a:fillRef>
+          <a:effectRef idx="0">
+            <a:schemeClr val="accent1"/>
+          </a:effectRef>
+          <a:fontRef idx="minor">
+            <a:schemeClr val="tx1"/>
+          </a:fontRef>
+        </p:style>
+      </p:cxnSp>
+      <p:cxnSp>
+        <p:nvCxnSpPr>
+          <p:cNvPr id="16" name="Elbow Connector 15">
+            <a:extLst>
+              <a:ext uri="{FF2B5EF4-FFF2-40B4-BE49-F238E27FC236}">
+                <a16:creationId xmlns:a16="http://schemas.microsoft.com/office/drawing/2014/main" id="{A6BABE7A-F53B-F94B-9441-759DEACEE784}"/>
+              </a:ext>
+            </a:extLst>
+          </p:cNvPr>
+          <p:cNvCxnSpPr>
+            <a:cxnSpLocks/>
+            <a:stCxn id="47" idx="3"/>
+          </p:cNvCxnSpPr>
+          <p:nvPr/>
+        </p:nvCxnSpPr>
+        <p:spPr>
+          <a:xfrm flipV="1">
+            <a:off x="2828562" y="2567089"/>
+            <a:ext cx="827810" cy="3326314"/>
+          </a:xfrm>
+          <a:prstGeom prst="bentConnector2">
+            <a:avLst/>
+          </a:prstGeom>
+          <a:ln>
+            <a:solidFill>
+              <a:schemeClr val="tx1"/>
+            </a:solidFill>
+            <a:tailEnd type="triangle"/>
+          </a:ln>
+        </p:spPr>
+        <p:style>
+          <a:lnRef idx="1">
+            <a:schemeClr val="accent1"/>
+          </a:lnRef>
+          <a:fillRef idx="0">
+            <a:schemeClr val="accent1"/>
+          </a:fillRef>
+          <a:effectRef idx="0">
+            <a:schemeClr val="accent1"/>
+          </a:effectRef>
+          <a:fontRef idx="minor">
+            <a:schemeClr val="tx1"/>
+          </a:fontRef>
+        </p:style>
+      </p:cxnSp>
+    </p:spTree>
+    <p:extLst>
+      <p:ext uri="{BB962C8B-B14F-4D97-AF65-F5344CB8AC3E}">
+        <p14:creationId xmlns:p14="http://schemas.microsoft.com/office/powerpoint/2010/main" val="2803377483"/>
+      </p:ext>
+    </p:extLst>
+  </p:cSld>
+  <p:clrMapOvr>
+    <a:masterClrMapping/>
+  </p:clrMapOvr>
+</p:sld>
+</file>
+
+<file path=ppt/slides/slide2.xml><?xml version="1.0" encoding="utf-8"?>
 <p:sld xmlns:a="http://schemas.openxmlformats.org/drawingml/2006/main" xmlns:r="http://schemas.openxmlformats.org/officeDocument/2006/relationships" xmlns:p="http://schemas.openxmlformats.org/presentationml/2006/main">
   <p:cSld>
     <p:spTree>
@@ -3903,7 +5300,7 @@
                   <a:schemeClr val="tx1"/>
                 </a:solidFill>
               </a:rPr>
-              <a:t>rca-1</a:t>
+              <a:t>rca1</a:t>
             </a:r>
           </a:p>
           <a:p>
@@ -3914,8 +5311,16 @@
                   <a:schemeClr val="tx1"/>
                 </a:solidFill>
               </a:rPr>
-              <a:t>(Subaru R710 running Debian 9.x)</a:t>
-            </a:r>
+              <a:t>(Dell R410 running Debian 9.x)</a:t>
+            </a:r>
+          </a:p>
+          <a:p>
+            <a:pPr algn="ctr"/>
+            <a:endParaRPr lang="en-US" dirty="0">
+              <a:solidFill>
+                <a:schemeClr val="tx1"/>
+              </a:solidFill>
+            </a:endParaRPr>
           </a:p>
         </p:txBody>
       </p:sp>
@@ -3984,7 +5389,7 @@
                   <a:schemeClr val="tx1"/>
                 </a:solidFill>
               </a:rPr>
-              <a:t>rfa-1</a:t>
+              <a:t>rfa1</a:t>
             </a:r>
             <a:endParaRPr lang="en-US" sz="1200" dirty="0">
               <a:solidFill>
@@ -4000,13 +5405,8 @@
                   <a:schemeClr val="tx1"/>
                 </a:solidFill>
               </a:rPr>
-              <a:t>(Running Debian 9.x)</a:t>
-            </a:r>
-            <a:endParaRPr lang="en-US" dirty="0">
-              <a:solidFill>
-                <a:schemeClr val="tx1"/>
-              </a:solidFill>
-            </a:endParaRPr>
+              <a:t>(Dell R710 running Debian 9.x)</a:t>
+            </a:r>
           </a:p>
           <a:p>
             <a:pPr algn="ctr"/>
@@ -4083,7 +5483,7 @@
                   <a:schemeClr val="tx1"/>
                 </a:solidFill>
               </a:rPr>
-              <a:t>rga-1</a:t>
+              <a:t>rga1</a:t>
             </a:r>
           </a:p>
           <a:p>
@@ -4094,7 +5494,7 @@
                   <a:schemeClr val="tx1"/>
                 </a:solidFill>
               </a:rPr>
-              <a:t>(Subaru R710 running Debian 9.x)</a:t>
+              <a:t>(Dell R710 running Debian 9.x)</a:t>
             </a:r>
           </a:p>
           <a:p>
@@ -5375,7 +6775,15 @@
             </a:pPr>
             <a:r>
               <a:rPr lang="en-US" sz="1000" dirty="0"/>
-              <a:t>/software, (50GB)</a:t>
+              <a:t>/</a:t>
+            </a:r>
+            <a:r>
+              <a:rPr lang="en-US" sz="1000" dirty="0" err="1"/>
+              <a:t>operdata</a:t>
+            </a:r>
+            <a:r>
+              <a:rPr lang="en-US" sz="1000" dirty="0"/>
+              <a:t>, (150GB)</a:t>
             </a:r>
           </a:p>
           <a:p>
@@ -5385,7 +6793,7 @@
             </a:pPr>
             <a:r>
               <a:rPr lang="en-US" sz="1000" dirty="0"/>
-              <a:t>/home/xxx, (100 GB)</a:t>
+              <a:t>/backup, (100 GB)</a:t>
             </a:r>
           </a:p>
           <a:p>
@@ -5396,7 +6804,7 @@
     </p:spTree>
     <p:extLst>
       <p:ext uri="{BB962C8B-B14F-4D97-AF65-F5344CB8AC3E}">
-        <p14:creationId xmlns:p14="http://schemas.microsoft.com/office/powerpoint/2010/main" val="2803377483"/>
+        <p14:creationId xmlns:p14="http://schemas.microsoft.com/office/powerpoint/2010/main" val="571368622"/>
       </p:ext>
     </p:extLst>
   </p:cSld>
@@ -5406,7 +6814,7 @@
 </p:sld>
 </file>
 
-<file path=ppt/slides/slide2.xml><?xml version="1.0" encoding="utf-8"?>
+<file path=ppt/slides/slide3.xml><?xml version="1.0" encoding="utf-8"?>
 <p:sld xmlns:a="http://schemas.openxmlformats.org/drawingml/2006/main" xmlns:r="http://schemas.openxmlformats.org/officeDocument/2006/relationships" xmlns:p="http://schemas.openxmlformats.org/presentationml/2006/main" show="0">
   <p:cSld>
     <p:spTree>
@@ -6398,7 +7806,7 @@
 </p:sld>
 </file>
 
-<file path=ppt/slides/slide3.xml><?xml version="1.0" encoding="utf-8"?>
+<file path=ppt/slides/slide4.xml><?xml version="1.0" encoding="utf-8"?>
 <p:sld xmlns:a="http://schemas.openxmlformats.org/drawingml/2006/main" xmlns:r="http://schemas.openxmlformats.org/officeDocument/2006/relationships" xmlns:p="http://schemas.openxmlformats.org/presentationml/2006/main" show="0">
   <p:cSld>
     <p:spTree>

</xml_diff>